<commit_message>
adding notebook for experimental peaks analyis
</commit_message>
<xml_diff>
--- a/analysis/peak analyis, experimental data/01-22-2024.pptx
+++ b/analysis/peak analyis, experimental data/01-22-2024.pptx
@@ -9,6 +9,7 @@
     <p:sldId id="258" r:id="rId3"/>
     <p:sldId id="259" r:id="rId4"/>
     <p:sldId id="260" r:id="rId5"/>
+    <p:sldId id="261" r:id="rId6"/>
   </p:sldIdLst>
   <p:sldSz cx="12192000" cy="6858000"/>
   <p:notesSz cx="6858000" cy="9144000"/>
@@ -3679,6 +3680,96 @@
 </p:sld>
 </file>
 
+<file path=ppt/slides/slide5.xml><?xml version="1.0" encoding="utf-8"?>
+<p:sld xmlns:a="http://schemas.openxmlformats.org/drawingml/2006/main" xmlns:r="http://schemas.openxmlformats.org/officeDocument/2006/relationships" xmlns:p="http://schemas.openxmlformats.org/presentationml/2006/main">
+  <p:cSld>
+    <p:spTree>
+      <p:nvGrpSpPr>
+        <p:cNvPr id="1" name=""/>
+        <p:cNvGrpSpPr/>
+        <p:nvPr/>
+      </p:nvGrpSpPr>
+      <p:grpSpPr>
+        <a:xfrm>
+          <a:off x="0" y="0"/>
+          <a:ext cx="0" cy="0"/>
+          <a:chOff x="0" y="0"/>
+          <a:chExt cx="0" cy="0"/>
+        </a:xfrm>
+      </p:grpSpPr>
+      <p:pic>
+        <p:nvPicPr>
+          <p:cNvPr id="5" name="Picture 4" descr="A graph of different colored lines&#10;&#10;Description automatically generated">
+            <a:extLst>
+              <a:ext uri="{FF2B5EF4-FFF2-40B4-BE49-F238E27FC236}">
+                <a16:creationId xmlns:a16="http://schemas.microsoft.com/office/drawing/2014/main" id="{D0C80D2C-83B3-B760-31E7-790C8BB08FC4}"/>
+              </a:ext>
+            </a:extLst>
+          </p:cNvPr>
+          <p:cNvPicPr>
+            <a:picLocks noChangeAspect="1"/>
+          </p:cNvPicPr>
+          <p:nvPr/>
+        </p:nvPicPr>
+        <p:blipFill>
+          <a:blip r:embed="rId2"/>
+          <a:stretch>
+            <a:fillRect/>
+          </a:stretch>
+        </p:blipFill>
+        <p:spPr>
+          <a:xfrm>
+            <a:off x="0" y="471487"/>
+            <a:ext cx="12160664" cy="2445884"/>
+          </a:xfrm>
+          <a:prstGeom prst="rect">
+            <a:avLst/>
+          </a:prstGeom>
+        </p:spPr>
+      </p:pic>
+      <p:pic>
+        <p:nvPicPr>
+          <p:cNvPr id="11" name="Picture 10" descr="A graph of different colored lines&#10;&#10;Description automatically generated">
+            <a:extLst>
+              <a:ext uri="{FF2B5EF4-FFF2-40B4-BE49-F238E27FC236}">
+                <a16:creationId xmlns:a16="http://schemas.microsoft.com/office/drawing/2014/main" id="{A768F5B1-1C47-F498-479E-E14DE4ADEB2B}"/>
+              </a:ext>
+            </a:extLst>
+          </p:cNvPr>
+          <p:cNvPicPr>
+            <a:picLocks noChangeAspect="1"/>
+          </p:cNvPicPr>
+          <p:nvPr/>
+        </p:nvPicPr>
+        <p:blipFill>
+          <a:blip r:embed="rId3"/>
+          <a:stretch>
+            <a:fillRect/>
+          </a:stretch>
+        </p:blipFill>
+        <p:spPr>
+          <a:xfrm>
+            <a:off x="0" y="3550920"/>
+            <a:ext cx="12160664" cy="2445884"/>
+          </a:xfrm>
+          <a:prstGeom prst="rect">
+            <a:avLst/>
+          </a:prstGeom>
+        </p:spPr>
+      </p:pic>
+    </p:spTree>
+    <p:extLst>
+      <p:ext uri="{BB962C8B-B14F-4D97-AF65-F5344CB8AC3E}">
+        <p14:creationId xmlns:p14="http://schemas.microsoft.com/office/powerpoint/2010/main" val="610758325"/>
+      </p:ext>
+    </p:extLst>
+  </p:cSld>
+  <p:clrMapOvr>
+    <a:masterClrMapping/>
+  </p:clrMapOvr>
+</p:sld>
+</file>
+
 <file path=ppt/theme/theme1.xml><?xml version="1.0" encoding="utf-8"?>
 <a:theme xmlns:a="http://schemas.openxmlformats.org/drawingml/2006/main" name="Office Theme">
   <a:themeElements>

</xml_diff>